<commit_message>
Added welcome screen and small tutorial
</commit_message>
<xml_diff>
--- a/ShieldsUp/objects.pptx
+++ b/ShieldsUp/objects.pptx
@@ -6,6 +6,13 @@
   </p:sldMasterIdLst>
   <p:sldIdLst>
     <p:sldId id="258" r:id="rId2"/>
+    <p:sldId id="259" r:id="rId3"/>
+    <p:sldId id="260" r:id="rId4"/>
+    <p:sldId id="261" r:id="rId5"/>
+    <p:sldId id="262" r:id="rId6"/>
+    <p:sldId id="263" r:id="rId7"/>
+    <p:sldId id="264" r:id="rId8"/>
+    <p:sldId id="265" r:id="rId9"/>
   </p:sldIdLst>
   <p:sldSz cx="9144000" cy="6858000" type="screen4x3"/>
   <p:notesSz cx="6858000" cy="9144000"/>
@@ -288,7 +295,8 @@
           <a:p>
             <a:fld id="{44E1E47A-DE3C-45F1-B849-B3E6FEB33980}" type="datetimeFigureOut">
               <a:rPr lang="en-US" smtClean="0"/>
-              <a:t>11/30/2013</a:t>
+              <a:pPr/>
+              <a:t>12/1/2013</a:t>
             </a:fld>
             <a:endParaRPr lang="en-US"/>
           </a:p>
@@ -330,6 +338,7 @@
           <a:p>
             <a:fld id="{563C56C5-7C30-4EB8-9F48-540971DC987D}" type="slidenum">
               <a:rPr lang="en-US" smtClean="0"/>
+              <a:pPr/>
               <a:t>‹#›</a:t>
             </a:fld>
             <a:endParaRPr lang="en-US"/>
@@ -453,7 +462,8 @@
           <a:p>
             <a:fld id="{44E1E47A-DE3C-45F1-B849-B3E6FEB33980}" type="datetimeFigureOut">
               <a:rPr lang="en-US" smtClean="0"/>
-              <a:t>11/30/2013</a:t>
+              <a:pPr/>
+              <a:t>12/1/2013</a:t>
             </a:fld>
             <a:endParaRPr lang="en-US"/>
           </a:p>
@@ -495,6 +505,7 @@
           <a:p>
             <a:fld id="{563C56C5-7C30-4EB8-9F48-540971DC987D}" type="slidenum">
               <a:rPr lang="en-US" smtClean="0"/>
+              <a:pPr/>
               <a:t>‹#›</a:t>
             </a:fld>
             <a:endParaRPr lang="en-US"/>
@@ -628,7 +639,8 @@
           <a:p>
             <a:fld id="{44E1E47A-DE3C-45F1-B849-B3E6FEB33980}" type="datetimeFigureOut">
               <a:rPr lang="en-US" smtClean="0"/>
-              <a:t>11/30/2013</a:t>
+              <a:pPr/>
+              <a:t>12/1/2013</a:t>
             </a:fld>
             <a:endParaRPr lang="en-US"/>
           </a:p>
@@ -670,6 +682,7 @@
           <a:p>
             <a:fld id="{563C56C5-7C30-4EB8-9F48-540971DC987D}" type="slidenum">
               <a:rPr lang="en-US" smtClean="0"/>
+              <a:pPr/>
               <a:t>‹#›</a:t>
             </a:fld>
             <a:endParaRPr lang="en-US"/>
@@ -793,7 +806,8 @@
           <a:p>
             <a:fld id="{44E1E47A-DE3C-45F1-B849-B3E6FEB33980}" type="datetimeFigureOut">
               <a:rPr lang="en-US" smtClean="0"/>
-              <a:t>11/30/2013</a:t>
+              <a:pPr/>
+              <a:t>12/1/2013</a:t>
             </a:fld>
             <a:endParaRPr lang="en-US"/>
           </a:p>
@@ -835,6 +849,7 @@
           <a:p>
             <a:fld id="{563C56C5-7C30-4EB8-9F48-540971DC987D}" type="slidenum">
               <a:rPr lang="en-US" smtClean="0"/>
+              <a:pPr/>
               <a:t>‹#›</a:t>
             </a:fld>
             <a:endParaRPr lang="en-US"/>
@@ -1034,7 +1049,8 @@
           <a:p>
             <a:fld id="{44E1E47A-DE3C-45F1-B849-B3E6FEB33980}" type="datetimeFigureOut">
               <a:rPr lang="en-US" smtClean="0"/>
-              <a:t>11/30/2013</a:t>
+              <a:pPr/>
+              <a:t>12/1/2013</a:t>
             </a:fld>
             <a:endParaRPr lang="en-US"/>
           </a:p>
@@ -1076,6 +1092,7 @@
           <a:p>
             <a:fld id="{563C56C5-7C30-4EB8-9F48-540971DC987D}" type="slidenum">
               <a:rPr lang="en-US" smtClean="0"/>
+              <a:pPr/>
               <a:t>‹#›</a:t>
             </a:fld>
             <a:endParaRPr lang="en-US"/>
@@ -1317,7 +1334,8 @@
           <a:p>
             <a:fld id="{44E1E47A-DE3C-45F1-B849-B3E6FEB33980}" type="datetimeFigureOut">
               <a:rPr lang="en-US" smtClean="0"/>
-              <a:t>11/30/2013</a:t>
+              <a:pPr/>
+              <a:t>12/1/2013</a:t>
             </a:fld>
             <a:endParaRPr lang="en-US"/>
           </a:p>
@@ -1359,6 +1377,7 @@
           <a:p>
             <a:fld id="{563C56C5-7C30-4EB8-9F48-540971DC987D}" type="slidenum">
               <a:rPr lang="en-US" smtClean="0"/>
+              <a:pPr/>
               <a:t>‹#›</a:t>
             </a:fld>
             <a:endParaRPr lang="en-US"/>
@@ -1734,7 +1753,8 @@
           <a:p>
             <a:fld id="{44E1E47A-DE3C-45F1-B849-B3E6FEB33980}" type="datetimeFigureOut">
               <a:rPr lang="en-US" smtClean="0"/>
-              <a:t>11/30/2013</a:t>
+              <a:pPr/>
+              <a:t>12/1/2013</a:t>
             </a:fld>
             <a:endParaRPr lang="en-US"/>
           </a:p>
@@ -1776,6 +1796,7 @@
           <a:p>
             <a:fld id="{563C56C5-7C30-4EB8-9F48-540971DC987D}" type="slidenum">
               <a:rPr lang="en-US" smtClean="0"/>
+              <a:pPr/>
               <a:t>‹#›</a:t>
             </a:fld>
             <a:endParaRPr lang="en-US"/>
@@ -1847,7 +1868,8 @@
           <a:p>
             <a:fld id="{44E1E47A-DE3C-45F1-B849-B3E6FEB33980}" type="datetimeFigureOut">
               <a:rPr lang="en-US" smtClean="0"/>
-              <a:t>11/30/2013</a:t>
+              <a:pPr/>
+              <a:t>12/1/2013</a:t>
             </a:fld>
             <a:endParaRPr lang="en-US"/>
           </a:p>
@@ -1889,6 +1911,7 @@
           <a:p>
             <a:fld id="{563C56C5-7C30-4EB8-9F48-540971DC987D}" type="slidenum">
               <a:rPr lang="en-US" smtClean="0"/>
+              <a:pPr/>
               <a:t>‹#›</a:t>
             </a:fld>
             <a:endParaRPr lang="en-US"/>
@@ -1937,7 +1960,8 @@
           <a:p>
             <a:fld id="{44E1E47A-DE3C-45F1-B849-B3E6FEB33980}" type="datetimeFigureOut">
               <a:rPr lang="en-US" smtClean="0"/>
-              <a:t>11/30/2013</a:t>
+              <a:pPr/>
+              <a:t>12/1/2013</a:t>
             </a:fld>
             <a:endParaRPr lang="en-US"/>
           </a:p>
@@ -1979,6 +2003,7 @@
           <a:p>
             <a:fld id="{563C56C5-7C30-4EB8-9F48-540971DC987D}" type="slidenum">
               <a:rPr lang="en-US" smtClean="0"/>
+              <a:pPr/>
               <a:t>‹#›</a:t>
             </a:fld>
             <a:endParaRPr lang="en-US"/>
@@ -2209,7 +2234,8 @@
           <a:p>
             <a:fld id="{44E1E47A-DE3C-45F1-B849-B3E6FEB33980}" type="datetimeFigureOut">
               <a:rPr lang="en-US" smtClean="0"/>
-              <a:t>11/30/2013</a:t>
+              <a:pPr/>
+              <a:t>12/1/2013</a:t>
             </a:fld>
             <a:endParaRPr lang="en-US"/>
           </a:p>
@@ -2251,6 +2277,7 @@
           <a:p>
             <a:fld id="{563C56C5-7C30-4EB8-9F48-540971DC987D}" type="slidenum">
               <a:rPr lang="en-US" smtClean="0"/>
+              <a:pPr/>
               <a:t>‹#›</a:t>
             </a:fld>
             <a:endParaRPr lang="en-US"/>
@@ -2457,7 +2484,8 @@
           <a:p>
             <a:fld id="{44E1E47A-DE3C-45F1-B849-B3E6FEB33980}" type="datetimeFigureOut">
               <a:rPr lang="en-US" smtClean="0"/>
-              <a:t>11/30/2013</a:t>
+              <a:pPr/>
+              <a:t>12/1/2013</a:t>
             </a:fld>
             <a:endParaRPr lang="en-US"/>
           </a:p>
@@ -2499,6 +2527,7 @@
           <a:p>
             <a:fld id="{563C56C5-7C30-4EB8-9F48-540971DC987D}" type="slidenum">
               <a:rPr lang="en-US" smtClean="0"/>
+              <a:pPr/>
               <a:t>‹#›</a:t>
             </a:fld>
             <a:endParaRPr lang="en-US"/>
@@ -2665,7 +2694,8 @@
           <a:p>
             <a:fld id="{44E1E47A-DE3C-45F1-B849-B3E6FEB33980}" type="datetimeFigureOut">
               <a:rPr lang="en-US" smtClean="0"/>
-              <a:t>11/30/2013</a:t>
+              <a:pPr/>
+              <a:t>12/1/2013</a:t>
             </a:fld>
             <a:endParaRPr lang="en-US"/>
           </a:p>
@@ -2743,6 +2773,7 @@
           <a:p>
             <a:fld id="{563C56C5-7C30-4EB8-9F48-540971DC987D}" type="slidenum">
               <a:rPr lang="en-US" smtClean="0"/>
+              <a:pPr/>
               <a:t>‹#›</a:t>
             </a:fld>
             <a:endParaRPr lang="en-US"/>
@@ -3037,289 +3068,16 @@
       </p:grpSpPr>
       <p:sp>
         <p:nvSpPr>
-          <p:cNvPr id="4" name="Trapezoid 3"/>
+          <p:cNvPr id="17" name="Diamond 16"/>
           <p:cNvSpPr/>
           <p:nvPr/>
         </p:nvSpPr>
         <p:spPr>
           <a:xfrm>
-            <a:off x="1905000" y="2438400"/>
-            <a:ext cx="914400" cy="609600"/>
-          </a:xfrm>
-          <a:prstGeom prst="trapezoid">
-            <a:avLst>
-              <a:gd name="adj" fmla="val 22059"/>
-            </a:avLst>
-          </a:prstGeom>
-        </p:spPr>
-        <p:style>
-          <a:lnRef idx="1">
-            <a:schemeClr val="accent1"/>
-          </a:lnRef>
-          <a:fillRef idx="3">
-            <a:schemeClr val="accent1"/>
-          </a:fillRef>
-          <a:effectRef idx="2">
-            <a:schemeClr val="accent1"/>
-          </a:effectRef>
-          <a:fontRef idx="minor">
-            <a:schemeClr val="lt1"/>
-          </a:fontRef>
-        </p:style>
-        <p:txBody>
-          <a:bodyPr rtlCol="0" anchor="ctr"/>
-          <a:lstStyle/>
-          <a:p>
-            <a:pPr algn="ctr"/>
-            <a:endParaRPr lang="en-US"/>
-          </a:p>
-        </p:txBody>
-      </p:sp>
-      <p:sp>
-        <p:nvSpPr>
-          <p:cNvPr id="5" name="Rounded Rectangle 4"/>
-          <p:cNvSpPr/>
-          <p:nvPr/>
-        </p:nvSpPr>
-        <p:spPr>
-          <a:xfrm>
-            <a:off x="2286000" y="2133600"/>
-            <a:ext cx="152400" cy="457200"/>
-          </a:xfrm>
-          <a:prstGeom prst="roundRect">
-            <a:avLst/>
-          </a:prstGeom>
-        </p:spPr>
-        <p:style>
-          <a:lnRef idx="3">
-            <a:schemeClr val="lt1"/>
-          </a:lnRef>
-          <a:fillRef idx="1">
-            <a:schemeClr val="accent1"/>
-          </a:fillRef>
-          <a:effectRef idx="1">
-            <a:schemeClr val="accent1"/>
-          </a:effectRef>
-          <a:fontRef idx="minor">
-            <a:schemeClr val="lt1"/>
-          </a:fontRef>
-        </p:style>
-        <p:txBody>
-          <a:bodyPr rtlCol="0" anchor="ctr"/>
-          <a:lstStyle/>
-          <a:p>
-            <a:pPr algn="ctr"/>
-            <a:endParaRPr lang="en-US"/>
-          </a:p>
-        </p:txBody>
-      </p:sp>
-      <p:sp>
-        <p:nvSpPr>
-          <p:cNvPr id="6" name="Trapezoid 5"/>
-          <p:cNvSpPr/>
-          <p:nvPr/>
-        </p:nvSpPr>
-        <p:spPr>
-          <a:xfrm rot="10800000">
-            <a:off x="685800" y="2209800"/>
-            <a:ext cx="914400" cy="609600"/>
-          </a:xfrm>
-          <a:prstGeom prst="trapezoid">
-            <a:avLst>
-              <a:gd name="adj" fmla="val 22059"/>
-            </a:avLst>
-          </a:prstGeom>
-        </p:spPr>
-        <p:style>
-          <a:lnRef idx="1">
-            <a:schemeClr val="accent2"/>
-          </a:lnRef>
-          <a:fillRef idx="3">
-            <a:schemeClr val="accent2"/>
-          </a:fillRef>
-          <a:effectRef idx="2">
-            <a:schemeClr val="accent2"/>
-          </a:effectRef>
-          <a:fontRef idx="minor">
-            <a:schemeClr val="lt1"/>
-          </a:fontRef>
-        </p:style>
-        <p:txBody>
-          <a:bodyPr rtlCol="0" anchor="ctr"/>
-          <a:lstStyle/>
-          <a:p>
-            <a:pPr algn="ctr"/>
-            <a:endParaRPr lang="en-US"/>
-          </a:p>
-        </p:txBody>
-      </p:sp>
-      <p:sp>
-        <p:nvSpPr>
-          <p:cNvPr id="7" name="Rounded Rectangle 6"/>
-          <p:cNvSpPr/>
-          <p:nvPr/>
-        </p:nvSpPr>
-        <p:spPr>
-          <a:xfrm rot="10800000">
-            <a:off x="1066800" y="2667000"/>
-            <a:ext cx="152400" cy="457200"/>
-          </a:xfrm>
-          <a:prstGeom prst="roundRect">
-            <a:avLst/>
-          </a:prstGeom>
-        </p:spPr>
-        <p:style>
-          <a:lnRef idx="3">
-            <a:schemeClr val="lt1"/>
-          </a:lnRef>
-          <a:fillRef idx="1">
-            <a:schemeClr val="accent2"/>
-          </a:fillRef>
-          <a:effectRef idx="1">
-            <a:schemeClr val="accent2"/>
-          </a:effectRef>
-          <a:fontRef idx="minor">
-            <a:schemeClr val="lt1"/>
-          </a:fontRef>
-        </p:style>
-        <p:txBody>
-          <a:bodyPr rtlCol="0" anchor="ctr"/>
-          <a:lstStyle/>
-          <a:p>
-            <a:pPr algn="ctr"/>
-            <a:endParaRPr lang="en-US"/>
-          </a:p>
-        </p:txBody>
-      </p:sp>
-      <p:sp>
-        <p:nvSpPr>
-          <p:cNvPr id="9" name="7-Point Star 8"/>
-          <p:cNvSpPr/>
-          <p:nvPr/>
-        </p:nvSpPr>
-        <p:spPr>
-          <a:xfrm>
-            <a:off x="838200" y="1600200"/>
-            <a:ext cx="457200" cy="457200"/>
-          </a:xfrm>
-          <a:prstGeom prst="star7">
-            <a:avLst/>
-          </a:prstGeom>
-        </p:spPr>
-        <p:style>
-          <a:lnRef idx="0">
-            <a:schemeClr val="accent1"/>
-          </a:lnRef>
-          <a:fillRef idx="3">
-            <a:schemeClr val="accent1"/>
-          </a:fillRef>
-          <a:effectRef idx="3">
-            <a:schemeClr val="accent1"/>
-          </a:effectRef>
-          <a:fontRef idx="minor">
-            <a:schemeClr val="lt1"/>
-          </a:fontRef>
-        </p:style>
-        <p:txBody>
-          <a:bodyPr rtlCol="0" anchor="ctr"/>
-          <a:lstStyle/>
-          <a:p>
-            <a:pPr algn="ctr"/>
-            <a:endParaRPr lang="en-US"/>
-          </a:p>
-        </p:txBody>
-      </p:sp>
-      <p:sp>
-        <p:nvSpPr>
-          <p:cNvPr id="10" name="Rounded Rectangle 9"/>
-          <p:cNvSpPr/>
-          <p:nvPr/>
-        </p:nvSpPr>
-        <p:spPr>
-          <a:xfrm>
-            <a:off x="1524000" y="1752600"/>
-            <a:ext cx="685800" cy="152400"/>
-          </a:xfrm>
-          <a:prstGeom prst="roundRect">
-            <a:avLst/>
-          </a:prstGeom>
-        </p:spPr>
-        <p:style>
-          <a:lnRef idx="2">
-            <a:schemeClr val="accent1">
-              <a:shade val="50000"/>
-            </a:schemeClr>
-          </a:lnRef>
-          <a:fillRef idx="1">
-            <a:schemeClr val="accent1"/>
-          </a:fillRef>
-          <a:effectRef idx="0">
-            <a:schemeClr val="accent1"/>
-          </a:effectRef>
-          <a:fontRef idx="minor">
-            <a:schemeClr val="lt1"/>
-          </a:fontRef>
-        </p:style>
-        <p:txBody>
-          <a:bodyPr rtlCol="0" anchor="ctr"/>
-          <a:lstStyle/>
-          <a:p>
-            <a:pPr algn="ctr"/>
-            <a:endParaRPr lang="en-US"/>
-          </a:p>
-        </p:txBody>
-      </p:sp>
-      <p:cxnSp>
-        <p:nvCxnSpPr>
-          <p:cNvPr id="12" name="Straight Connector 11"/>
-          <p:cNvCxnSpPr/>
-          <p:nvPr/>
-        </p:nvCxnSpPr>
-        <p:spPr>
-          <a:xfrm>
-            <a:off x="304800" y="152400"/>
-            <a:ext cx="0" cy="2514600"/>
-          </a:xfrm>
-          <a:prstGeom prst="line">
-            <a:avLst/>
-          </a:prstGeom>
-          <a:ln w="76200"/>
-          <a:effectLst>
-            <a:outerShdw blurRad="50800" dist="38100" dir="8100000" algn="tr" rotWithShape="0">
-              <a:prstClr val="black">
-                <a:alpha val="40000"/>
-              </a:prstClr>
-            </a:outerShdw>
-            <a:softEdge rad="12700"/>
-          </a:effectLst>
-        </p:spPr>
-        <p:style>
-          <a:lnRef idx="3">
-            <a:schemeClr val="accent1"/>
-          </a:lnRef>
-          <a:fillRef idx="0">
-            <a:schemeClr val="accent1"/>
-          </a:fillRef>
-          <a:effectRef idx="2">
-            <a:schemeClr val="accent1"/>
-          </a:effectRef>
-          <a:fontRef idx="minor">
-            <a:schemeClr val="tx1"/>
-          </a:fontRef>
-        </p:style>
-      </p:cxnSp>
-      <p:sp>
-        <p:nvSpPr>
-          <p:cNvPr id="14" name="Flowchart: Delay 13"/>
-          <p:cNvSpPr/>
-          <p:nvPr/>
-        </p:nvSpPr>
-        <p:spPr>
-          <a:xfrm rot="16200000">
-            <a:off x="990600" y="914400"/>
-            <a:ext cx="155448" cy="612648"/>
-          </a:xfrm>
-          <a:prstGeom prst="flowChartDelay">
+            <a:off x="914400" y="152400"/>
+            <a:ext cx="228600" cy="228600"/>
+          </a:xfrm>
+          <a:prstGeom prst="diamond">
             <a:avLst/>
           </a:prstGeom>
         </p:spPr>
@@ -3348,16 +3106,54 @@
       </p:sp>
       <p:sp>
         <p:nvSpPr>
-          <p:cNvPr id="15" name="Flowchart: Delay 14"/>
+          <p:cNvPr id="18" name="Diamond 17"/>
           <p:cNvSpPr/>
           <p:nvPr/>
         </p:nvSpPr>
         <p:spPr>
-          <a:xfrm rot="16200000">
-            <a:off x="2667000" y="914400"/>
-            <a:ext cx="155448" cy="612648"/>
-          </a:xfrm>
-          <a:prstGeom prst="flowChartDelay">
+          <a:xfrm>
+            <a:off x="152400" y="152400"/>
+            <a:ext cx="228600" cy="228600"/>
+          </a:xfrm>
+          <a:prstGeom prst="diamond">
+            <a:avLst/>
+          </a:prstGeom>
+        </p:spPr>
+        <p:style>
+          <a:lnRef idx="0">
+            <a:schemeClr val="accent3"/>
+          </a:lnRef>
+          <a:fillRef idx="3">
+            <a:schemeClr val="accent3"/>
+          </a:fillRef>
+          <a:effectRef idx="3">
+            <a:schemeClr val="accent3"/>
+          </a:effectRef>
+          <a:fontRef idx="minor">
+            <a:schemeClr val="lt1"/>
+          </a:fontRef>
+        </p:style>
+        <p:txBody>
+          <a:bodyPr rtlCol="0" anchor="ctr"/>
+          <a:lstStyle/>
+          <a:p>
+            <a:pPr algn="ctr"/>
+            <a:endParaRPr lang="en-US"/>
+          </a:p>
+        </p:txBody>
+      </p:sp>
+      <p:sp>
+        <p:nvSpPr>
+          <p:cNvPr id="19" name="Diamond 18"/>
+          <p:cNvSpPr/>
+          <p:nvPr/>
+        </p:nvSpPr>
+        <p:spPr>
+          <a:xfrm>
+            <a:off x="533400" y="152400"/>
+            <a:ext cx="228600" cy="228600"/>
+          </a:xfrm>
+          <a:prstGeom prst="diamond">
             <a:avLst/>
           </a:prstGeom>
         </p:spPr>
@@ -3384,18 +3180,119 @@
           </a:p>
         </p:txBody>
       </p:sp>
-      <p:sp>
-        <p:nvSpPr>
-          <p:cNvPr id="16" name="Flowchart: Delay 15"/>
+    </p:spTree>
+  </p:cSld>
+  <p:clrMapOvr>
+    <a:masterClrMapping/>
+  </p:clrMapOvr>
+</p:sld>
+</file>
+
+<file path=ppt/slides/slide2.xml><?xml version="1.0" encoding="utf-8"?>
+<p:sld xmlns:a="http://schemas.openxmlformats.org/drawingml/2006/main" xmlns:r="http://schemas.openxmlformats.org/officeDocument/2006/relationships" xmlns:p="http://schemas.openxmlformats.org/presentationml/2006/main">
+  <p:cSld>
+    <p:spTree>
+      <p:nvGrpSpPr>
+        <p:cNvPr id="1" name=""/>
+        <p:cNvGrpSpPr/>
+        <p:nvPr/>
+      </p:nvGrpSpPr>
+      <p:grpSpPr>
+        <a:xfrm>
+          <a:off x="0" y="0"/>
+          <a:ext cx="0" cy="0"/>
+          <a:chOff x="0" y="0"/>
+          <a:chExt cx="0" cy="0"/>
+        </a:xfrm>
+      </p:grpSpPr>
+      <p:sp>
+        <p:nvSpPr>
+          <p:cNvPr id="20" name="12-Point Star 19"/>
           <p:cNvSpPr/>
           <p:nvPr/>
         </p:nvSpPr>
         <p:spPr>
-          <a:xfrm rot="16200000">
-            <a:off x="1828800" y="914400"/>
-            <a:ext cx="155448" cy="612648"/>
-          </a:xfrm>
-          <a:prstGeom prst="flowChartDelay">
+          <a:xfrm>
+            <a:off x="152400" y="152400"/>
+            <a:ext cx="304800" cy="304800"/>
+          </a:xfrm>
+          <a:prstGeom prst="star12">
+            <a:avLst/>
+          </a:prstGeom>
+        </p:spPr>
+        <p:style>
+          <a:lnRef idx="0">
+            <a:schemeClr val="accent2"/>
+          </a:lnRef>
+          <a:fillRef idx="3">
+            <a:schemeClr val="accent2"/>
+          </a:fillRef>
+          <a:effectRef idx="3">
+            <a:schemeClr val="accent2"/>
+          </a:effectRef>
+          <a:fontRef idx="minor">
+            <a:schemeClr val="lt1"/>
+          </a:fontRef>
+        </p:style>
+        <p:txBody>
+          <a:bodyPr rtlCol="0" anchor="ctr"/>
+          <a:lstStyle/>
+          <a:p>
+            <a:pPr algn="ctr"/>
+            <a:endParaRPr lang="en-US"/>
+          </a:p>
+        </p:txBody>
+      </p:sp>
+      <p:sp>
+        <p:nvSpPr>
+          <p:cNvPr id="21" name="12-Point Star 20"/>
+          <p:cNvSpPr/>
+          <p:nvPr/>
+        </p:nvSpPr>
+        <p:spPr>
+          <a:xfrm>
+            <a:off x="1066800" y="152400"/>
+            <a:ext cx="304800" cy="304800"/>
+          </a:xfrm>
+          <a:prstGeom prst="star12">
+            <a:avLst/>
+          </a:prstGeom>
+        </p:spPr>
+        <p:style>
+          <a:lnRef idx="0">
+            <a:schemeClr val="accent4"/>
+          </a:lnRef>
+          <a:fillRef idx="3">
+            <a:schemeClr val="accent4"/>
+          </a:fillRef>
+          <a:effectRef idx="3">
+            <a:schemeClr val="accent4"/>
+          </a:effectRef>
+          <a:fontRef idx="minor">
+            <a:schemeClr val="lt1"/>
+          </a:fontRef>
+        </p:style>
+        <p:txBody>
+          <a:bodyPr rtlCol="0" anchor="ctr"/>
+          <a:lstStyle/>
+          <a:p>
+            <a:pPr algn="ctr"/>
+            <a:endParaRPr lang="en-US"/>
+          </a:p>
+        </p:txBody>
+      </p:sp>
+      <p:sp>
+        <p:nvSpPr>
+          <p:cNvPr id="22" name="12-Point Star 21"/>
+          <p:cNvSpPr/>
+          <p:nvPr/>
+        </p:nvSpPr>
+        <p:spPr>
+          <a:xfrm>
+            <a:off x="609600" y="152400"/>
+            <a:ext cx="304800" cy="304800"/>
+          </a:xfrm>
+          <a:prstGeom prst="star12">
             <a:avLst/>
           </a:prstGeom>
         </p:spPr>
@@ -3422,18 +3319,43 @@
           </a:p>
         </p:txBody>
       </p:sp>
-      <p:sp>
-        <p:nvSpPr>
-          <p:cNvPr id="17" name="Diamond 16"/>
+    </p:spTree>
+  </p:cSld>
+  <p:clrMapOvr>
+    <a:masterClrMapping/>
+  </p:clrMapOvr>
+</p:sld>
+</file>
+
+<file path=ppt/slides/slide3.xml><?xml version="1.0" encoding="utf-8"?>
+<p:sld xmlns:a="http://schemas.openxmlformats.org/drawingml/2006/main" xmlns:r="http://schemas.openxmlformats.org/officeDocument/2006/relationships" xmlns:p="http://schemas.openxmlformats.org/presentationml/2006/main">
+  <p:cSld>
+    <p:spTree>
+      <p:nvGrpSpPr>
+        <p:cNvPr id="1" name=""/>
+        <p:cNvGrpSpPr/>
+        <p:nvPr/>
+      </p:nvGrpSpPr>
+      <p:grpSpPr>
+        <a:xfrm>
+          <a:off x="0" y="0"/>
+          <a:ext cx="0" cy="0"/>
+          <a:chOff x="0" y="0"/>
+          <a:chExt cx="0" cy="0"/>
+        </a:xfrm>
+      </p:grpSpPr>
+      <p:sp>
+        <p:nvSpPr>
+          <p:cNvPr id="14" name="Flowchart: Delay 13"/>
           <p:cNvSpPr/>
           <p:nvPr/>
         </p:nvSpPr>
         <p:spPr>
-          <a:xfrm>
-            <a:off x="1676400" y="152400"/>
-            <a:ext cx="228600" cy="228600"/>
-          </a:xfrm>
-          <a:prstGeom prst="diamond">
+          <a:xfrm rot="16200000">
+            <a:off x="381000" y="-76200"/>
+            <a:ext cx="155448" cy="612648"/>
+          </a:xfrm>
+          <a:prstGeom prst="flowChartDelay">
             <a:avLst/>
           </a:prstGeom>
         </p:spPr>
@@ -3462,16 +3384,54 @@
       </p:sp>
       <p:sp>
         <p:nvSpPr>
-          <p:cNvPr id="18" name="Diamond 17"/>
+          <p:cNvPr id="15" name="Flowchart: Delay 14"/>
           <p:cNvSpPr/>
           <p:nvPr/>
         </p:nvSpPr>
         <p:spPr>
-          <a:xfrm>
-            <a:off x="914400" y="152400"/>
-            <a:ext cx="228600" cy="228600"/>
-          </a:xfrm>
-          <a:prstGeom prst="diamond">
+          <a:xfrm rot="16200000">
+            <a:off x="2057400" y="-76200"/>
+            <a:ext cx="155448" cy="612648"/>
+          </a:xfrm>
+          <a:prstGeom prst="flowChartDelay">
+            <a:avLst/>
+          </a:prstGeom>
+        </p:spPr>
+        <p:style>
+          <a:lnRef idx="0">
+            <a:schemeClr val="accent2"/>
+          </a:lnRef>
+          <a:fillRef idx="3">
+            <a:schemeClr val="accent2"/>
+          </a:fillRef>
+          <a:effectRef idx="3">
+            <a:schemeClr val="accent2"/>
+          </a:effectRef>
+          <a:fontRef idx="minor">
+            <a:schemeClr val="lt1"/>
+          </a:fontRef>
+        </p:style>
+        <p:txBody>
+          <a:bodyPr rtlCol="0" anchor="ctr"/>
+          <a:lstStyle/>
+          <a:p>
+            <a:pPr algn="ctr"/>
+            <a:endParaRPr lang="en-US"/>
+          </a:p>
+        </p:txBody>
+      </p:sp>
+      <p:sp>
+        <p:nvSpPr>
+          <p:cNvPr id="16" name="Flowchart: Delay 15"/>
+          <p:cNvSpPr/>
+          <p:nvPr/>
+        </p:nvSpPr>
+        <p:spPr>
+          <a:xfrm rot="16200000">
+            <a:off x="1219200" y="-76200"/>
+            <a:ext cx="155448" cy="612648"/>
+          </a:xfrm>
+          <a:prstGeom prst="flowChartDelay">
             <a:avLst/>
           </a:prstGeom>
         </p:spPr>
@@ -3498,158 +3458,31 @@
           </a:p>
         </p:txBody>
       </p:sp>
-      <p:sp>
-        <p:nvSpPr>
-          <p:cNvPr id="19" name="Diamond 18"/>
-          <p:cNvSpPr/>
-          <p:nvPr/>
-        </p:nvSpPr>
-        <p:spPr>
-          <a:xfrm>
-            <a:off x="1295400" y="152400"/>
-            <a:ext cx="228600" cy="228600"/>
-          </a:xfrm>
-          <a:prstGeom prst="diamond">
-            <a:avLst/>
-          </a:prstGeom>
-        </p:spPr>
-        <p:style>
-          <a:lnRef idx="0">
-            <a:schemeClr val="accent2"/>
-          </a:lnRef>
-          <a:fillRef idx="3">
-            <a:schemeClr val="accent2"/>
-          </a:fillRef>
-          <a:effectRef idx="3">
-            <a:schemeClr val="accent2"/>
-          </a:effectRef>
-          <a:fontRef idx="minor">
-            <a:schemeClr val="lt1"/>
-          </a:fontRef>
-        </p:style>
-        <p:txBody>
-          <a:bodyPr rtlCol="0" anchor="ctr"/>
-          <a:lstStyle/>
-          <a:p>
-            <a:pPr algn="ctr"/>
-            <a:endParaRPr lang="en-US"/>
-          </a:p>
-        </p:txBody>
-      </p:sp>
-      <p:sp>
-        <p:nvSpPr>
-          <p:cNvPr id="20" name="12-Point Star 19"/>
-          <p:cNvSpPr/>
-          <p:nvPr/>
-        </p:nvSpPr>
-        <p:spPr>
-          <a:xfrm>
-            <a:off x="914400" y="533400"/>
-            <a:ext cx="304800" cy="304800"/>
-          </a:xfrm>
-          <a:prstGeom prst="star12">
-            <a:avLst/>
-          </a:prstGeom>
-        </p:spPr>
-        <p:style>
-          <a:lnRef idx="0">
-            <a:schemeClr val="accent2"/>
-          </a:lnRef>
-          <a:fillRef idx="3">
-            <a:schemeClr val="accent2"/>
-          </a:fillRef>
-          <a:effectRef idx="3">
-            <a:schemeClr val="accent2"/>
-          </a:effectRef>
-          <a:fontRef idx="minor">
-            <a:schemeClr val="lt1"/>
-          </a:fontRef>
-        </p:style>
-        <p:txBody>
-          <a:bodyPr rtlCol="0" anchor="ctr"/>
-          <a:lstStyle/>
-          <a:p>
-            <a:pPr algn="ctr"/>
-            <a:endParaRPr lang="en-US"/>
-          </a:p>
-        </p:txBody>
-      </p:sp>
-      <p:sp>
-        <p:nvSpPr>
-          <p:cNvPr id="21" name="12-Point Star 20"/>
-          <p:cNvSpPr/>
-          <p:nvPr/>
-        </p:nvSpPr>
-        <p:spPr>
-          <a:xfrm>
-            <a:off x="1828800" y="533400"/>
-            <a:ext cx="304800" cy="304800"/>
-          </a:xfrm>
-          <a:prstGeom prst="star12">
-            <a:avLst/>
-          </a:prstGeom>
-        </p:spPr>
-        <p:style>
-          <a:lnRef idx="0">
-            <a:schemeClr val="accent4"/>
-          </a:lnRef>
-          <a:fillRef idx="3">
-            <a:schemeClr val="accent4"/>
-          </a:fillRef>
-          <a:effectRef idx="3">
-            <a:schemeClr val="accent4"/>
-          </a:effectRef>
-          <a:fontRef idx="minor">
-            <a:schemeClr val="lt1"/>
-          </a:fontRef>
-        </p:style>
-        <p:txBody>
-          <a:bodyPr rtlCol="0" anchor="ctr"/>
-          <a:lstStyle/>
-          <a:p>
-            <a:pPr algn="ctr"/>
-            <a:endParaRPr lang="en-US"/>
-          </a:p>
-        </p:txBody>
-      </p:sp>
-      <p:sp>
-        <p:nvSpPr>
-          <p:cNvPr id="22" name="12-Point Star 21"/>
-          <p:cNvSpPr/>
-          <p:nvPr/>
-        </p:nvSpPr>
-        <p:spPr>
-          <a:xfrm>
-            <a:off x="1371600" y="533400"/>
-            <a:ext cx="304800" cy="304800"/>
-          </a:xfrm>
-          <a:prstGeom prst="star12">
-            <a:avLst/>
-          </a:prstGeom>
-        </p:spPr>
-        <p:style>
-          <a:lnRef idx="0">
-            <a:schemeClr val="accent3"/>
-          </a:lnRef>
-          <a:fillRef idx="3">
-            <a:schemeClr val="accent3"/>
-          </a:fillRef>
-          <a:effectRef idx="3">
-            <a:schemeClr val="accent3"/>
-          </a:effectRef>
-          <a:fontRef idx="minor">
-            <a:schemeClr val="lt1"/>
-          </a:fontRef>
-        </p:style>
-        <p:txBody>
-          <a:bodyPr rtlCol="0" anchor="ctr"/>
-          <a:lstStyle/>
-          <a:p>
-            <a:pPr algn="ctr"/>
-            <a:endParaRPr lang="en-US"/>
-          </a:p>
-        </p:txBody>
-      </p:sp>
+    </p:spTree>
+  </p:cSld>
+  <p:clrMapOvr>
+    <a:masterClrMapping/>
+  </p:clrMapOvr>
+</p:sld>
+</file>
+
+<file path=ppt/slides/slide4.xml><?xml version="1.0" encoding="utf-8"?>
+<p:sld xmlns:a="http://schemas.openxmlformats.org/drawingml/2006/main" xmlns:r="http://schemas.openxmlformats.org/officeDocument/2006/relationships" xmlns:p="http://schemas.openxmlformats.org/presentationml/2006/main">
+  <p:cSld>
+    <p:spTree>
+      <p:nvGrpSpPr>
+        <p:cNvPr id="1" name=""/>
+        <p:cNvGrpSpPr/>
+        <p:nvPr/>
+      </p:nvGrpSpPr>
+      <p:grpSpPr>
+        <a:xfrm>
+          <a:off x="0" y="0"/>
+          <a:ext cx="0" cy="0"/>
+          <a:chOff x="0" y="0"/>
+          <a:chExt cx="0" cy="0"/>
+        </a:xfrm>
+      </p:grpSpPr>
       <p:sp>
         <p:nvSpPr>
           <p:cNvPr id="23" name="Rectangle 22"/>
@@ -3658,7 +3491,7 @@
         </p:nvSpPr>
         <p:spPr>
           <a:xfrm>
-            <a:off x="419100" y="3505200"/>
+            <a:off x="152400" y="152400"/>
             <a:ext cx="609600" cy="152400"/>
           </a:xfrm>
           <a:prstGeom prst="rect">
@@ -3688,23 +3521,48 @@
           </a:p>
         </p:txBody>
       </p:sp>
-      <p:sp>
-        <p:nvSpPr>
-          <p:cNvPr id="2" name="Circular Arrow 1"/>
+    </p:spTree>
+  </p:cSld>
+  <p:clrMapOvr>
+    <a:masterClrMapping/>
+  </p:clrMapOvr>
+</p:sld>
+</file>
+
+<file path=ppt/slides/slide5.xml><?xml version="1.0" encoding="utf-8"?>
+<p:sld xmlns:a="http://schemas.openxmlformats.org/drawingml/2006/main" xmlns:r="http://schemas.openxmlformats.org/officeDocument/2006/relationships" xmlns:p="http://schemas.openxmlformats.org/presentationml/2006/main">
+  <p:cSld>
+    <p:spTree>
+      <p:nvGrpSpPr>
+        <p:cNvPr id="1" name=""/>
+        <p:cNvGrpSpPr/>
+        <p:nvPr/>
+      </p:nvGrpSpPr>
+      <p:grpSpPr>
+        <a:xfrm>
+          <a:off x="0" y="0"/>
+          <a:ext cx="0" cy="0"/>
+          <a:chOff x="0" y="0"/>
+          <a:chExt cx="0" cy="0"/>
+        </a:xfrm>
+      </p:grpSpPr>
+      <p:sp>
+        <p:nvSpPr>
+          <p:cNvPr id="29" name="Circular Arrow 28"/>
           <p:cNvSpPr/>
           <p:nvPr/>
         </p:nvSpPr>
         <p:spPr>
           <a:xfrm>
-            <a:off x="1328057" y="3239696"/>
-            <a:ext cx="489204" cy="521208"/>
+            <a:off x="4210655" y="3060250"/>
+            <a:ext cx="304800" cy="324740"/>
           </a:xfrm>
           <a:prstGeom prst="circularArrow">
             <a:avLst>
-              <a:gd name="adj1" fmla="val 11810"/>
+              <a:gd name="adj1" fmla="val 13792"/>
               <a:gd name="adj2" fmla="val 1142319"/>
-              <a:gd name="adj3" fmla="val 20417235"/>
-              <a:gd name="adj4" fmla="val 2188079"/>
+              <a:gd name="adj3" fmla="val 20346544"/>
+              <a:gd name="adj4" fmla="val 2285709"/>
               <a:gd name="adj5" fmla="val 18331"/>
             </a:avLst>
           </a:prstGeom>
@@ -3738,13 +3596,331 @@
       </p:sp>
       <p:sp>
         <p:nvSpPr>
+          <p:cNvPr id="30" name="Pentagon 29"/>
+          <p:cNvSpPr/>
+          <p:nvPr/>
+        </p:nvSpPr>
+        <p:spPr>
+          <a:xfrm>
+            <a:off x="4648200" y="3124200"/>
+            <a:ext cx="172055" cy="219733"/>
+          </a:xfrm>
+          <a:prstGeom prst="homePlate">
+            <a:avLst>
+              <a:gd name="adj" fmla="val 201887"/>
+            </a:avLst>
+          </a:prstGeom>
+        </p:spPr>
+        <p:style>
+          <a:lnRef idx="1">
+            <a:schemeClr val="accent6"/>
+          </a:lnRef>
+          <a:fillRef idx="3">
+            <a:schemeClr val="accent6"/>
+          </a:fillRef>
+          <a:effectRef idx="2">
+            <a:schemeClr val="accent6"/>
+          </a:effectRef>
+          <a:fontRef idx="minor">
+            <a:schemeClr val="lt1"/>
+          </a:fontRef>
+        </p:style>
+        <p:txBody>
+          <a:bodyPr rtlCol="0" anchor="ctr"/>
+          <a:lstStyle/>
+          <a:p>
+            <a:pPr algn="ctr"/>
+            <a:endParaRPr lang="en-US"/>
+          </a:p>
+        </p:txBody>
+      </p:sp>
+      <p:sp>
+        <p:nvSpPr>
+          <p:cNvPr id="32" name="Striped Right Arrow 31"/>
+          <p:cNvSpPr/>
+          <p:nvPr/>
+        </p:nvSpPr>
+        <p:spPr>
+          <a:xfrm flipH="1">
+            <a:off x="4953000" y="3124200"/>
+            <a:ext cx="304800" cy="228600"/>
+          </a:xfrm>
+          <a:prstGeom prst="stripedRightArrow">
+            <a:avLst/>
+          </a:prstGeom>
+        </p:spPr>
+        <p:style>
+          <a:lnRef idx="1">
+            <a:schemeClr val="accent6"/>
+          </a:lnRef>
+          <a:fillRef idx="3">
+            <a:schemeClr val="accent6"/>
+          </a:fillRef>
+          <a:effectRef idx="2">
+            <a:schemeClr val="accent6"/>
+          </a:effectRef>
+          <a:fontRef idx="minor">
+            <a:schemeClr val="lt1"/>
+          </a:fontRef>
+        </p:style>
+        <p:txBody>
+          <a:bodyPr rtlCol="0" anchor="ctr"/>
+          <a:lstStyle/>
+          <a:p>
+            <a:pPr algn="ctr"/>
+            <a:endParaRPr lang="en-US">
+              <a:solidFill>
+                <a:schemeClr val="tx1"/>
+              </a:solidFill>
+            </a:endParaRPr>
+          </a:p>
+        </p:txBody>
+      </p:sp>
+    </p:spTree>
+  </p:cSld>
+  <p:clrMapOvr>
+    <a:masterClrMapping/>
+  </p:clrMapOvr>
+</p:sld>
+</file>
+
+<file path=ppt/slides/slide6.xml><?xml version="1.0" encoding="utf-8"?>
+<p:sld xmlns:a="http://schemas.openxmlformats.org/drawingml/2006/main" xmlns:r="http://schemas.openxmlformats.org/officeDocument/2006/relationships" xmlns:p="http://schemas.openxmlformats.org/presentationml/2006/main">
+  <p:cSld>
+    <p:spTree>
+      <p:nvGrpSpPr>
+        <p:cNvPr id="1" name=""/>
+        <p:cNvGrpSpPr/>
+        <p:nvPr/>
+      </p:nvGrpSpPr>
+      <p:grpSpPr>
+        <a:xfrm>
+          <a:off x="0" y="0"/>
+          <a:ext cx="0" cy="0"/>
+          <a:chOff x="0" y="0"/>
+          <a:chExt cx="0" cy="0"/>
+        </a:xfrm>
+      </p:grpSpPr>
+      <p:grpSp>
+        <p:nvGrpSpPr>
+          <p:cNvPr id="9" name="Group 29"/>
+          <p:cNvGrpSpPr/>
+          <p:nvPr/>
+        </p:nvGrpSpPr>
+        <p:grpSpPr>
+          <a:xfrm>
+            <a:off x="152400" y="152400"/>
+            <a:ext cx="914400" cy="914400"/>
+            <a:chOff x="1905000" y="2133600"/>
+            <a:chExt cx="914400" cy="914400"/>
+          </a:xfrm>
+        </p:grpSpPr>
+        <p:sp>
+          <p:nvSpPr>
+            <p:cNvPr id="4" name="Trapezoid 3"/>
+            <p:cNvSpPr/>
+            <p:nvPr/>
+          </p:nvSpPr>
+          <p:spPr>
+            <a:xfrm>
+              <a:off x="1905000" y="2438400"/>
+              <a:ext cx="914400" cy="609600"/>
+            </a:xfrm>
+            <a:prstGeom prst="trapezoid">
+              <a:avLst>
+                <a:gd name="adj" fmla="val 22059"/>
+              </a:avLst>
+            </a:prstGeom>
+          </p:spPr>
+          <p:style>
+            <a:lnRef idx="1">
+              <a:schemeClr val="accent1"/>
+            </a:lnRef>
+            <a:fillRef idx="3">
+              <a:schemeClr val="accent1"/>
+            </a:fillRef>
+            <a:effectRef idx="2">
+              <a:schemeClr val="accent1"/>
+            </a:effectRef>
+            <a:fontRef idx="minor">
+              <a:schemeClr val="lt1"/>
+            </a:fontRef>
+          </p:style>
+          <p:txBody>
+            <a:bodyPr rtlCol="0" anchor="ctr"/>
+            <a:lstStyle/>
+            <a:p>
+              <a:pPr algn="ctr"/>
+              <a:endParaRPr lang="en-US"/>
+            </a:p>
+          </p:txBody>
+        </p:sp>
+        <p:sp>
+          <p:nvSpPr>
+            <p:cNvPr id="5" name="Rounded Rectangle 4"/>
+            <p:cNvSpPr/>
+            <p:nvPr/>
+          </p:nvSpPr>
+          <p:spPr>
+            <a:xfrm>
+              <a:off x="2286000" y="2133600"/>
+              <a:ext cx="152400" cy="457200"/>
+            </a:xfrm>
+            <a:prstGeom prst="roundRect">
+              <a:avLst/>
+            </a:prstGeom>
+          </p:spPr>
+          <p:style>
+            <a:lnRef idx="3">
+              <a:schemeClr val="lt1"/>
+            </a:lnRef>
+            <a:fillRef idx="1">
+              <a:schemeClr val="accent1"/>
+            </a:fillRef>
+            <a:effectRef idx="1">
+              <a:schemeClr val="accent1"/>
+            </a:effectRef>
+            <a:fontRef idx="minor">
+              <a:schemeClr val="lt1"/>
+            </a:fontRef>
+          </p:style>
+          <p:txBody>
+            <a:bodyPr rtlCol="0" anchor="ctr"/>
+            <a:lstStyle/>
+            <a:p>
+              <a:pPr algn="ctr"/>
+              <a:endParaRPr lang="en-US"/>
+            </a:p>
+          </p:txBody>
+        </p:sp>
+      </p:grpSp>
+      <p:grpSp>
+        <p:nvGrpSpPr>
+          <p:cNvPr id="10" name="Group 28"/>
+          <p:cNvGrpSpPr/>
+          <p:nvPr/>
+        </p:nvGrpSpPr>
+        <p:grpSpPr>
+          <a:xfrm>
+            <a:off x="1371600" y="228600"/>
+            <a:ext cx="914400" cy="914400"/>
+            <a:chOff x="685800" y="2209800"/>
+            <a:chExt cx="914400" cy="914400"/>
+          </a:xfrm>
+        </p:grpSpPr>
+        <p:sp>
+          <p:nvSpPr>
+            <p:cNvPr id="6" name="Trapezoid 5"/>
+            <p:cNvSpPr/>
+            <p:nvPr/>
+          </p:nvSpPr>
+          <p:spPr>
+            <a:xfrm rot="10800000">
+              <a:off x="685800" y="2209800"/>
+              <a:ext cx="914400" cy="609600"/>
+            </a:xfrm>
+            <a:prstGeom prst="trapezoid">
+              <a:avLst>
+                <a:gd name="adj" fmla="val 22059"/>
+              </a:avLst>
+            </a:prstGeom>
+          </p:spPr>
+          <p:style>
+            <a:lnRef idx="1">
+              <a:schemeClr val="accent2"/>
+            </a:lnRef>
+            <a:fillRef idx="3">
+              <a:schemeClr val="accent2"/>
+            </a:fillRef>
+            <a:effectRef idx="2">
+              <a:schemeClr val="accent2"/>
+            </a:effectRef>
+            <a:fontRef idx="minor">
+              <a:schemeClr val="lt1"/>
+            </a:fontRef>
+          </p:style>
+          <p:txBody>
+            <a:bodyPr rtlCol="0" anchor="ctr"/>
+            <a:lstStyle/>
+            <a:p>
+              <a:pPr algn="ctr"/>
+              <a:endParaRPr lang="en-US"/>
+            </a:p>
+          </p:txBody>
+        </p:sp>
+        <p:sp>
+          <p:nvSpPr>
+            <p:cNvPr id="7" name="Rounded Rectangle 6"/>
+            <p:cNvSpPr/>
+            <p:nvPr/>
+          </p:nvSpPr>
+          <p:spPr>
+            <a:xfrm rot="10800000">
+              <a:off x="1066800" y="2667000"/>
+              <a:ext cx="152400" cy="457200"/>
+            </a:xfrm>
+            <a:prstGeom prst="roundRect">
+              <a:avLst/>
+            </a:prstGeom>
+          </p:spPr>
+          <p:style>
+            <a:lnRef idx="3">
+              <a:schemeClr val="lt1"/>
+            </a:lnRef>
+            <a:fillRef idx="1">
+              <a:schemeClr val="accent2"/>
+            </a:fillRef>
+            <a:effectRef idx="1">
+              <a:schemeClr val="accent2"/>
+            </a:effectRef>
+            <a:fontRef idx="minor">
+              <a:schemeClr val="lt1"/>
+            </a:fontRef>
+          </p:style>
+          <p:txBody>
+            <a:bodyPr rtlCol="0" anchor="ctr"/>
+            <a:lstStyle/>
+            <a:p>
+              <a:pPr algn="ctr"/>
+              <a:endParaRPr lang="en-US"/>
+            </a:p>
+          </p:txBody>
+        </p:sp>
+      </p:grpSp>
+    </p:spTree>
+  </p:cSld>
+  <p:clrMapOvr>
+    <a:masterClrMapping/>
+  </p:clrMapOvr>
+</p:sld>
+</file>
+
+<file path=ppt/slides/slide7.xml><?xml version="1.0" encoding="utf-8"?>
+<p:sld xmlns:a="http://schemas.openxmlformats.org/drawingml/2006/main" xmlns:r="http://schemas.openxmlformats.org/officeDocument/2006/relationships" xmlns:p="http://schemas.openxmlformats.org/presentationml/2006/main">
+  <p:cSld>
+    <p:spTree>
+      <p:nvGrpSpPr>
+        <p:cNvPr id="1" name=""/>
+        <p:cNvGrpSpPr/>
+        <p:nvPr/>
+      </p:nvGrpSpPr>
+      <p:grpSpPr>
+        <a:xfrm>
+          <a:off x="0" y="0"/>
+          <a:ext cx="0" cy="0"/>
+          <a:chOff x="0" y="0"/>
+          <a:chExt cx="0" cy="0"/>
+        </a:xfrm>
+      </p:grpSpPr>
+      <p:sp>
+        <p:nvSpPr>
           <p:cNvPr id="3" name="Rounded Rectangle 2"/>
           <p:cNvSpPr/>
           <p:nvPr/>
         </p:nvSpPr>
         <p:spPr>
           <a:xfrm>
-            <a:off x="266700" y="3863775"/>
+            <a:off x="152400" y="152400"/>
             <a:ext cx="1104900" cy="403425"/>
           </a:xfrm>
           <a:prstGeom prst="roundRect">
@@ -3786,7 +3962,7 @@
         </p:nvSpPr>
         <p:spPr>
           <a:xfrm>
-            <a:off x="1524000" y="3863775"/>
+            <a:off x="1371600" y="152400"/>
             <a:ext cx="1104900" cy="403425"/>
           </a:xfrm>
           <a:prstGeom prst="roundRect">
@@ -3828,7 +4004,7 @@
         </p:nvSpPr>
         <p:spPr>
           <a:xfrm>
-            <a:off x="2755610" y="3863775"/>
+            <a:off x="2590800" y="152400"/>
             <a:ext cx="1104900" cy="403425"/>
           </a:xfrm>
           <a:prstGeom prst="roundRect">
@@ -3864,95 +4040,13 @@
       </p:sp>
       <p:sp>
         <p:nvSpPr>
-          <p:cNvPr id="8" name="Pentagon 7"/>
-          <p:cNvSpPr/>
-          <p:nvPr/>
-        </p:nvSpPr>
-        <p:spPr>
-          <a:xfrm>
-            <a:off x="2158528" y="3222060"/>
-            <a:ext cx="379476" cy="484632"/>
-          </a:xfrm>
-          <a:prstGeom prst="homePlate">
-            <a:avLst>
-              <a:gd name="adj" fmla="val 201887"/>
-            </a:avLst>
-          </a:prstGeom>
-        </p:spPr>
-        <p:style>
-          <a:lnRef idx="1">
-            <a:schemeClr val="accent6"/>
-          </a:lnRef>
-          <a:fillRef idx="3">
-            <a:schemeClr val="accent6"/>
-          </a:fillRef>
-          <a:effectRef idx="2">
-            <a:schemeClr val="accent6"/>
-          </a:effectRef>
-          <a:fontRef idx="minor">
-            <a:schemeClr val="lt1"/>
-          </a:fontRef>
-        </p:style>
-        <p:txBody>
-          <a:bodyPr rtlCol="0" anchor="ctr"/>
-          <a:lstStyle/>
-          <a:p>
-            <a:pPr algn="ctr"/>
-            <a:endParaRPr lang="en-US"/>
-          </a:p>
-        </p:txBody>
-      </p:sp>
-      <p:sp>
-        <p:nvSpPr>
-          <p:cNvPr id="11" name="Equal 10"/>
-          <p:cNvSpPr/>
-          <p:nvPr/>
-        </p:nvSpPr>
-        <p:spPr>
-          <a:xfrm rot="16200000">
-            <a:off x="2204357" y="3260161"/>
-            <a:ext cx="582386" cy="419100"/>
-          </a:xfrm>
-          <a:prstGeom prst="mathEqual">
-            <a:avLst/>
-          </a:prstGeom>
-        </p:spPr>
-        <p:style>
-          <a:lnRef idx="1">
-            <a:schemeClr val="accent6"/>
-          </a:lnRef>
-          <a:fillRef idx="3">
-            <a:schemeClr val="accent6"/>
-          </a:fillRef>
-          <a:effectRef idx="2">
-            <a:schemeClr val="accent6"/>
-          </a:effectRef>
-          <a:fontRef idx="minor">
-            <a:schemeClr val="lt1"/>
-          </a:fontRef>
-        </p:style>
-        <p:txBody>
-          <a:bodyPr rtlCol="0" anchor="ctr"/>
-          <a:lstStyle/>
-          <a:p>
-            <a:pPr algn="ctr"/>
-            <a:endParaRPr lang="en-US">
-              <a:solidFill>
-                <a:schemeClr val="tx1"/>
-              </a:solidFill>
-            </a:endParaRPr>
-          </a:p>
-        </p:txBody>
-      </p:sp>
-      <p:sp>
-        <p:nvSpPr>
           <p:cNvPr id="26" name="Rounded Rectangle 25"/>
           <p:cNvSpPr/>
           <p:nvPr/>
         </p:nvSpPr>
         <p:spPr>
           <a:xfrm>
-            <a:off x="4038600" y="3842004"/>
+            <a:off x="2362200" y="685800"/>
             <a:ext cx="2076450" cy="838200"/>
           </a:xfrm>
           <a:prstGeom prst="roundRect">
@@ -3994,7 +4088,7 @@
         </p:nvSpPr>
         <p:spPr>
           <a:xfrm>
-            <a:off x="6248400" y="3842004"/>
+            <a:off x="152400" y="685800"/>
             <a:ext cx="2076450" cy="838200"/>
           </a:xfrm>
           <a:prstGeom prst="roundRect">
@@ -4022,11 +4116,7 @@
             <a:pPr algn="ctr"/>
             <a:r>
               <a:rPr lang="en-US" sz="3600" dirty="0" smtClean="0"/>
-              <a:t>You </a:t>
-            </a:r>
-            <a:r>
-              <a:rPr lang="en-US" sz="3600" dirty="0" smtClean="0"/>
-              <a:t>Lose!</a:t>
+              <a:t>You Lose!</a:t>
             </a:r>
             <a:endParaRPr lang="en-US" sz="3600" dirty="0"/>
           </a:p>
@@ -4040,7 +4130,7 @@
         </p:nvSpPr>
         <p:spPr>
           <a:xfrm>
-            <a:off x="6248400" y="4876800"/>
+            <a:off x="152400" y="1676400"/>
             <a:ext cx="2076450" cy="838200"/>
           </a:xfrm>
           <a:prstGeom prst="roundRect">
@@ -4071,6 +4161,782 @@
               <a:t>Draw!</a:t>
             </a:r>
             <a:endParaRPr lang="en-US" sz="3600" dirty="0"/>
+          </a:p>
+        </p:txBody>
+      </p:sp>
+      <p:sp>
+        <p:nvSpPr>
+          <p:cNvPr id="29" name="Rounded Rectangle 28"/>
+          <p:cNvSpPr/>
+          <p:nvPr/>
+        </p:nvSpPr>
+        <p:spPr>
+          <a:xfrm>
+            <a:off x="2438400" y="1676400"/>
+            <a:ext cx="2076450" cy="838200"/>
+          </a:xfrm>
+          <a:prstGeom prst="roundRect">
+            <a:avLst/>
+          </a:prstGeom>
+        </p:spPr>
+        <p:style>
+          <a:lnRef idx="1">
+            <a:schemeClr val="dk1"/>
+          </a:lnRef>
+          <a:fillRef idx="2">
+            <a:schemeClr val="dk1"/>
+          </a:fillRef>
+          <a:effectRef idx="1">
+            <a:schemeClr val="dk1"/>
+          </a:effectRef>
+          <a:fontRef idx="minor">
+            <a:schemeClr val="dk1"/>
+          </a:fontRef>
+        </p:style>
+        <p:txBody>
+          <a:bodyPr rtlCol="0" anchor="ctr"/>
+          <a:lstStyle/>
+          <a:p>
+            <a:pPr algn="ctr"/>
+            <a:r>
+              <a:rPr lang="en-US" sz="3600" dirty="0" smtClean="0"/>
+              <a:t>Paused</a:t>
+            </a:r>
+            <a:endParaRPr lang="en-US" sz="3600" dirty="0"/>
+          </a:p>
+        </p:txBody>
+      </p:sp>
+      <p:sp>
+        <p:nvSpPr>
+          <p:cNvPr id="31" name="Rounded Rectangle 30"/>
+          <p:cNvSpPr/>
+          <p:nvPr/>
+        </p:nvSpPr>
+        <p:spPr>
+          <a:xfrm>
+            <a:off x="152400" y="2667000"/>
+            <a:ext cx="2076450" cy="838200"/>
+          </a:xfrm>
+          <a:prstGeom prst="roundRect">
+            <a:avLst/>
+          </a:prstGeom>
+        </p:spPr>
+        <p:style>
+          <a:lnRef idx="1">
+            <a:schemeClr val="accent1"/>
+          </a:lnRef>
+          <a:fillRef idx="2">
+            <a:schemeClr val="accent1"/>
+          </a:fillRef>
+          <a:effectRef idx="1">
+            <a:schemeClr val="accent1"/>
+          </a:effectRef>
+          <a:fontRef idx="minor">
+            <a:schemeClr val="dk1"/>
+          </a:fontRef>
+        </p:style>
+        <p:txBody>
+          <a:bodyPr rtlCol="0" anchor="ctr"/>
+          <a:lstStyle/>
+          <a:p>
+            <a:pPr algn="ctr"/>
+            <a:r>
+              <a:rPr lang="en-US" sz="3600" dirty="0" smtClean="0"/>
+              <a:t>Play</a:t>
+            </a:r>
+            <a:endParaRPr lang="en-US" sz="3600" dirty="0"/>
+          </a:p>
+        </p:txBody>
+      </p:sp>
+      <p:sp>
+        <p:nvSpPr>
+          <p:cNvPr id="32" name="Rounded Rectangle 31"/>
+          <p:cNvSpPr/>
+          <p:nvPr/>
+        </p:nvSpPr>
+        <p:spPr>
+          <a:xfrm>
+            <a:off x="2438400" y="2667000"/>
+            <a:ext cx="2076450" cy="838200"/>
+          </a:xfrm>
+          <a:prstGeom prst="roundRect">
+            <a:avLst/>
+          </a:prstGeom>
+        </p:spPr>
+        <p:style>
+          <a:lnRef idx="1">
+            <a:schemeClr val="accent1"/>
+          </a:lnRef>
+          <a:fillRef idx="2">
+            <a:schemeClr val="accent1"/>
+          </a:fillRef>
+          <a:effectRef idx="1">
+            <a:schemeClr val="accent1"/>
+          </a:effectRef>
+          <a:fontRef idx="minor">
+            <a:schemeClr val="dk1"/>
+          </a:fontRef>
+        </p:style>
+        <p:txBody>
+          <a:bodyPr rtlCol="0" anchor="ctr"/>
+          <a:lstStyle/>
+          <a:p>
+            <a:pPr algn="ctr"/>
+            <a:r>
+              <a:rPr lang="en-US" sz="3600" dirty="0" smtClean="0"/>
+              <a:t>Tutorial</a:t>
+            </a:r>
+            <a:endParaRPr lang="en-US" sz="3600" dirty="0"/>
+          </a:p>
+        </p:txBody>
+      </p:sp>
+      <p:sp>
+        <p:nvSpPr>
+          <p:cNvPr id="34" name="Rectangle 33"/>
+          <p:cNvSpPr/>
+          <p:nvPr/>
+        </p:nvSpPr>
+        <p:spPr>
+          <a:xfrm>
+            <a:off x="152400" y="3657600"/>
+            <a:ext cx="3264035" cy="923330"/>
+          </a:xfrm>
+          <a:prstGeom prst="rect">
+            <a:avLst/>
+          </a:prstGeom>
+          <a:noFill/>
+        </p:spPr>
+        <p:txBody>
+          <a:bodyPr wrap="none" lIns="91440" tIns="45720" rIns="91440" bIns="45720">
+            <a:spAutoFit/>
+            <a:scene3d>
+              <a:camera prst="orthographicFront"/>
+              <a:lightRig rig="flat" dir="tl">
+                <a:rot lat="0" lon="0" rev="6600000"/>
+              </a:lightRig>
+            </a:scene3d>
+            <a:sp3d extrusionH="25400" contourW="8890">
+              <a:bevelT w="38100" h="31750"/>
+              <a:contourClr>
+                <a:schemeClr val="accent2">
+                  <a:shade val="75000"/>
+                </a:schemeClr>
+              </a:contourClr>
+            </a:sp3d>
+          </a:bodyPr>
+          <a:lstStyle/>
+          <a:p>
+            <a:pPr algn="ctr"/>
+            <a:r>
+              <a:rPr lang="en-US" sz="5400" b="1" dirty="0" smtClean="0">
+                <a:ln w="11430"/>
+                <a:gradFill>
+                  <a:gsLst>
+                    <a:gs pos="0">
+                      <a:schemeClr val="accent2">
+                        <a:tint val="70000"/>
+                        <a:satMod val="245000"/>
+                      </a:schemeClr>
+                    </a:gs>
+                    <a:gs pos="75000">
+                      <a:schemeClr val="accent2">
+                        <a:tint val="90000"/>
+                        <a:shade val="60000"/>
+                        <a:satMod val="240000"/>
+                      </a:schemeClr>
+                    </a:gs>
+                    <a:gs pos="100000">
+                      <a:schemeClr val="accent2">
+                        <a:tint val="100000"/>
+                        <a:shade val="50000"/>
+                        <a:satMod val="240000"/>
+                      </a:schemeClr>
+                    </a:gs>
+                  </a:gsLst>
+                  <a:lin ang="5400000"/>
+                </a:gradFill>
+                <a:effectLst>
+                  <a:outerShdw blurRad="50800" dist="39000" dir="5460000" algn="tl">
+                    <a:srgbClr val="000000">
+                      <a:alpha val="38000"/>
+                    </a:srgbClr>
+                  </a:outerShdw>
+                </a:effectLst>
+              </a:rPr>
+              <a:t>Shields Up</a:t>
+            </a:r>
+            <a:endParaRPr lang="en-US" sz="5400" b="1" dirty="0">
+              <a:ln w="11430"/>
+              <a:gradFill>
+                <a:gsLst>
+                  <a:gs pos="0">
+                    <a:schemeClr val="accent2">
+                      <a:tint val="70000"/>
+                      <a:satMod val="245000"/>
+                    </a:schemeClr>
+                  </a:gs>
+                  <a:gs pos="75000">
+                    <a:schemeClr val="accent2">
+                      <a:tint val="90000"/>
+                      <a:shade val="60000"/>
+                      <a:satMod val="240000"/>
+                    </a:schemeClr>
+                  </a:gs>
+                  <a:gs pos="100000">
+                    <a:schemeClr val="accent2">
+                      <a:tint val="100000"/>
+                      <a:shade val="50000"/>
+                      <a:satMod val="240000"/>
+                    </a:schemeClr>
+                  </a:gs>
+                </a:gsLst>
+                <a:lin ang="5400000"/>
+              </a:gradFill>
+              <a:effectLst>
+                <a:outerShdw blurRad="50800" dist="39000" dir="5460000" algn="tl">
+                  <a:srgbClr val="000000">
+                    <a:alpha val="38000"/>
+                  </a:srgbClr>
+                </a:outerShdw>
+              </a:effectLst>
+            </a:endParaRPr>
+          </a:p>
+        </p:txBody>
+      </p:sp>
+    </p:spTree>
+  </p:cSld>
+  <p:clrMapOvr>
+    <a:masterClrMapping/>
+  </p:clrMapOvr>
+</p:sld>
+</file>
+
+<file path=ppt/slides/slide8.xml><?xml version="1.0" encoding="utf-8"?>
+<p:sld xmlns:a="http://schemas.openxmlformats.org/drawingml/2006/main" xmlns:r="http://schemas.openxmlformats.org/officeDocument/2006/relationships" xmlns:p="http://schemas.openxmlformats.org/presentationml/2006/main">
+  <p:cSld>
+    <p:spTree>
+      <p:nvGrpSpPr>
+        <p:cNvPr id="1" name=""/>
+        <p:cNvGrpSpPr/>
+        <p:nvPr/>
+      </p:nvGrpSpPr>
+      <p:grpSpPr>
+        <a:xfrm>
+          <a:off x="0" y="0"/>
+          <a:ext cx="0" cy="0"/>
+          <a:chOff x="0" y="0"/>
+          <a:chExt cx="0" cy="0"/>
+        </a:xfrm>
+      </p:grpSpPr>
+      <p:sp>
+        <p:nvSpPr>
+          <p:cNvPr id="10" name="Rounded Rectangle 9"/>
+          <p:cNvSpPr/>
+          <p:nvPr/>
+        </p:nvSpPr>
+        <p:spPr>
+          <a:xfrm>
+            <a:off x="5181600" y="152400"/>
+            <a:ext cx="2438400" cy="457200"/>
+          </a:xfrm>
+          <a:prstGeom prst="roundRect">
+            <a:avLst/>
+          </a:prstGeom>
+        </p:spPr>
+        <p:style>
+          <a:lnRef idx="1">
+            <a:schemeClr val="accent6"/>
+          </a:lnRef>
+          <a:fillRef idx="2">
+            <a:schemeClr val="accent6"/>
+          </a:fillRef>
+          <a:effectRef idx="1">
+            <a:schemeClr val="accent6"/>
+          </a:effectRef>
+          <a:fontRef idx="minor">
+            <a:schemeClr val="dk1"/>
+          </a:fontRef>
+        </p:style>
+        <p:txBody>
+          <a:bodyPr rtlCol="0" anchor="t" anchorCtr="0"/>
+          <a:lstStyle/>
+          <a:p>
+            <a:pPr algn="ctr"/>
+            <a:r>
+              <a:rPr lang="en-US" sz="1200" dirty="0" smtClean="0">
+                <a:solidFill>
+                  <a:srgbClr val="00B0F0"/>
+                </a:solidFill>
+              </a:rPr>
+              <a:t>3. </a:t>
+            </a:r>
+            <a:r>
+              <a:rPr lang="en-US" sz="1200" dirty="0" smtClean="0"/>
+              <a:t>Notice how color of cannon ball matches color of shield.</a:t>
+            </a:r>
+            <a:endParaRPr lang="en-US" sz="1200" dirty="0"/>
+          </a:p>
+        </p:txBody>
+      </p:sp>
+      <p:sp>
+        <p:nvSpPr>
+          <p:cNvPr id="4" name="Rounded Rectangular Callout 3"/>
+          <p:cNvSpPr/>
+          <p:nvPr/>
+        </p:nvSpPr>
+        <p:spPr>
+          <a:xfrm>
+            <a:off x="533400" y="152400"/>
+            <a:ext cx="1676400" cy="457200"/>
+          </a:xfrm>
+          <a:prstGeom prst="wedgeRoundRectCallout">
+            <a:avLst>
+              <a:gd name="adj1" fmla="val -77812"/>
+              <a:gd name="adj2" fmla="val 12972"/>
+              <a:gd name="adj3" fmla="val 16667"/>
+            </a:avLst>
+          </a:prstGeom>
+        </p:spPr>
+        <p:style>
+          <a:lnRef idx="1">
+            <a:schemeClr val="accent6"/>
+          </a:lnRef>
+          <a:fillRef idx="2">
+            <a:schemeClr val="accent6"/>
+          </a:fillRef>
+          <a:effectRef idx="1">
+            <a:schemeClr val="accent6"/>
+          </a:effectRef>
+          <a:fontRef idx="minor">
+            <a:schemeClr val="dk1"/>
+          </a:fontRef>
+        </p:style>
+        <p:txBody>
+          <a:bodyPr rtlCol="0" anchor="t" anchorCtr="0"/>
+          <a:lstStyle/>
+          <a:p>
+            <a:pPr algn="ctr"/>
+            <a:r>
+              <a:rPr lang="en-US" sz="1200" dirty="0" smtClean="0">
+                <a:solidFill>
+                  <a:srgbClr val="00B0F0"/>
+                </a:solidFill>
+              </a:rPr>
+              <a:t>1. </a:t>
+            </a:r>
+            <a:r>
+              <a:rPr lang="en-US" sz="1200" dirty="0" smtClean="0"/>
+              <a:t>This is your shield.</a:t>
+            </a:r>
+          </a:p>
+          <a:p>
+            <a:pPr algn="ctr"/>
+            <a:r>
+              <a:rPr lang="en-US" sz="1050" dirty="0" smtClean="0"/>
+              <a:t>Click on it to change color.</a:t>
+            </a:r>
+            <a:r>
+              <a:rPr lang="en-US" sz="1200" dirty="0" smtClean="0"/>
+              <a:t>  </a:t>
+            </a:r>
+            <a:endParaRPr lang="en-US" sz="1200" dirty="0"/>
+          </a:p>
+        </p:txBody>
+      </p:sp>
+      <p:sp>
+        <p:nvSpPr>
+          <p:cNvPr id="9" name="Rounded Rectangular Callout 8"/>
+          <p:cNvSpPr/>
+          <p:nvPr/>
+        </p:nvSpPr>
+        <p:spPr>
+          <a:xfrm>
+            <a:off x="2819400" y="152400"/>
+            <a:ext cx="1981200" cy="457200"/>
+          </a:xfrm>
+          <a:prstGeom prst="wedgeRoundRectCallout">
+            <a:avLst>
+              <a:gd name="adj1" fmla="val -74927"/>
+              <a:gd name="adj2" fmla="val 40908"/>
+              <a:gd name="adj3" fmla="val 16667"/>
+            </a:avLst>
+          </a:prstGeom>
+        </p:spPr>
+        <p:style>
+          <a:lnRef idx="1">
+            <a:schemeClr val="accent6"/>
+          </a:lnRef>
+          <a:fillRef idx="2">
+            <a:schemeClr val="accent6"/>
+          </a:fillRef>
+          <a:effectRef idx="1">
+            <a:schemeClr val="accent6"/>
+          </a:effectRef>
+          <a:fontRef idx="minor">
+            <a:schemeClr val="dk1"/>
+          </a:fontRef>
+        </p:style>
+        <p:txBody>
+          <a:bodyPr rtlCol="0" anchor="t" anchorCtr="0"/>
+          <a:lstStyle/>
+          <a:p>
+            <a:pPr algn="ctr"/>
+            <a:r>
+              <a:rPr lang="en-US" sz="1200" dirty="0" smtClean="0">
+                <a:solidFill>
+                  <a:srgbClr val="00B0F0"/>
+                </a:solidFill>
+              </a:rPr>
+              <a:t>2. </a:t>
+            </a:r>
+            <a:r>
+              <a:rPr lang="en-US" sz="1200" dirty="0" smtClean="0"/>
+              <a:t>This is your cannon.</a:t>
+            </a:r>
+          </a:p>
+          <a:p>
+            <a:pPr algn="ctr"/>
+            <a:r>
+              <a:rPr lang="en-US" sz="1000" dirty="0" smtClean="0"/>
+              <a:t>Click on it to fire a cannon ball</a:t>
+            </a:r>
+            <a:endParaRPr lang="en-US" sz="1100" dirty="0"/>
+          </a:p>
+        </p:txBody>
+      </p:sp>
+      <p:sp>
+        <p:nvSpPr>
+          <p:cNvPr id="15" name="Rounded Rectangular Callout 14"/>
+          <p:cNvSpPr/>
+          <p:nvPr/>
+        </p:nvSpPr>
+        <p:spPr>
+          <a:xfrm>
+            <a:off x="1219200" y="1600200"/>
+            <a:ext cx="1981200" cy="457200"/>
+          </a:xfrm>
+          <a:prstGeom prst="wedgeRoundRectCallout">
+            <a:avLst>
+              <a:gd name="adj1" fmla="val -100994"/>
+              <a:gd name="adj2" fmla="val -8060"/>
+              <a:gd name="adj3" fmla="val 16667"/>
+            </a:avLst>
+          </a:prstGeom>
+        </p:spPr>
+        <p:style>
+          <a:lnRef idx="1">
+            <a:schemeClr val="accent2"/>
+          </a:lnRef>
+          <a:fillRef idx="2">
+            <a:schemeClr val="accent2"/>
+          </a:fillRef>
+          <a:effectRef idx="1">
+            <a:schemeClr val="accent2"/>
+          </a:effectRef>
+          <a:fontRef idx="minor">
+            <a:schemeClr val="dk1"/>
+          </a:fontRef>
+        </p:style>
+        <p:txBody>
+          <a:bodyPr rtlCol="0" anchor="t" anchorCtr="0"/>
+          <a:lstStyle/>
+          <a:p>
+            <a:pPr algn="ctr"/>
+            <a:r>
+              <a:rPr lang="en-US" sz="1200" dirty="0" smtClean="0">
+                <a:solidFill>
+                  <a:srgbClr val="00B0F0"/>
+                </a:solidFill>
+              </a:rPr>
+              <a:t>1. </a:t>
+            </a:r>
+            <a:r>
+              <a:rPr lang="en-US" sz="1200" dirty="0" smtClean="0"/>
+              <a:t>This is enemy cannon </a:t>
+            </a:r>
+            <a:r>
+              <a:rPr lang="en-US" sz="1100" dirty="0" smtClean="0"/>
+              <a:t>It doesn’t have any shield</a:t>
+            </a:r>
+            <a:endParaRPr lang="en-US" sz="1100" dirty="0"/>
+          </a:p>
+        </p:txBody>
+      </p:sp>
+      <p:sp>
+        <p:nvSpPr>
+          <p:cNvPr id="17" name="Rounded Rectangle 16"/>
+          <p:cNvSpPr/>
+          <p:nvPr/>
+        </p:nvSpPr>
+        <p:spPr>
+          <a:xfrm>
+            <a:off x="3352800" y="1600200"/>
+            <a:ext cx="2286000" cy="457200"/>
+          </a:xfrm>
+          <a:prstGeom prst="roundRect">
+            <a:avLst/>
+          </a:prstGeom>
+        </p:spPr>
+        <p:style>
+          <a:lnRef idx="1">
+            <a:schemeClr val="accent2"/>
+          </a:lnRef>
+          <a:fillRef idx="2">
+            <a:schemeClr val="accent2"/>
+          </a:fillRef>
+          <a:effectRef idx="1">
+            <a:schemeClr val="accent2"/>
+          </a:effectRef>
+          <a:fontRef idx="minor">
+            <a:schemeClr val="dk1"/>
+          </a:fontRef>
+        </p:style>
+        <p:txBody>
+          <a:bodyPr rtlCol="0" anchor="t" anchorCtr="0"/>
+          <a:lstStyle/>
+          <a:p>
+            <a:pPr algn="ctr"/>
+            <a:r>
+              <a:rPr lang="en-US" sz="1200" dirty="0" smtClean="0">
+                <a:solidFill>
+                  <a:srgbClr val="00B0F0"/>
+                </a:solidFill>
+              </a:rPr>
+              <a:t>2. </a:t>
+            </a:r>
+            <a:r>
+              <a:rPr lang="en-US" sz="1200" dirty="0" smtClean="0"/>
+              <a:t>E</a:t>
+            </a:r>
+            <a:r>
+              <a:rPr lang="en-US" sz="1200" dirty="0" smtClean="0"/>
+              <a:t>nemy cannons fire cannon balls at regular intervals</a:t>
+            </a:r>
+            <a:endParaRPr lang="en-US" sz="1200" dirty="0"/>
+          </a:p>
+        </p:txBody>
+      </p:sp>
+      <p:sp>
+        <p:nvSpPr>
+          <p:cNvPr id="18" name="Rounded Rectangle 17"/>
+          <p:cNvSpPr/>
+          <p:nvPr/>
+        </p:nvSpPr>
+        <p:spPr>
+          <a:xfrm>
+            <a:off x="5791200" y="1600200"/>
+            <a:ext cx="2667000" cy="457200"/>
+          </a:xfrm>
+          <a:prstGeom prst="roundRect">
+            <a:avLst/>
+          </a:prstGeom>
+        </p:spPr>
+        <p:style>
+          <a:lnRef idx="1">
+            <a:schemeClr val="accent2"/>
+          </a:lnRef>
+          <a:fillRef idx="2">
+            <a:schemeClr val="accent2"/>
+          </a:fillRef>
+          <a:effectRef idx="1">
+            <a:schemeClr val="accent2"/>
+          </a:effectRef>
+          <a:fontRef idx="minor">
+            <a:schemeClr val="dk1"/>
+          </a:fontRef>
+        </p:style>
+        <p:txBody>
+          <a:bodyPr rtlCol="0" anchor="t" anchorCtr="0"/>
+          <a:lstStyle/>
+          <a:p>
+            <a:pPr algn="ctr"/>
+            <a:r>
+              <a:rPr lang="en-US" sz="1200" dirty="0" smtClean="0">
+                <a:solidFill>
+                  <a:srgbClr val="00B0F0"/>
+                </a:solidFill>
+              </a:rPr>
+              <a:t>3. </a:t>
+            </a:r>
+            <a:r>
+              <a:rPr lang="en-US" sz="1200" dirty="0" smtClean="0"/>
+              <a:t>Your shields can block enemy cannon balls by matching their colors.</a:t>
+            </a:r>
+            <a:endParaRPr lang="en-US" sz="1200" dirty="0"/>
+          </a:p>
+        </p:txBody>
+      </p:sp>
+      <p:sp>
+        <p:nvSpPr>
+          <p:cNvPr id="19" name="Rounded Rectangle 18"/>
+          <p:cNvSpPr/>
+          <p:nvPr/>
+        </p:nvSpPr>
+        <p:spPr>
+          <a:xfrm>
+            <a:off x="304800" y="2209800"/>
+            <a:ext cx="3124200" cy="457200"/>
+          </a:xfrm>
+          <a:prstGeom prst="roundRect">
+            <a:avLst/>
+          </a:prstGeom>
+        </p:spPr>
+        <p:style>
+          <a:lnRef idx="1">
+            <a:schemeClr val="accent2"/>
+          </a:lnRef>
+          <a:fillRef idx="2">
+            <a:schemeClr val="accent2"/>
+          </a:fillRef>
+          <a:effectRef idx="1">
+            <a:schemeClr val="accent2"/>
+          </a:effectRef>
+          <a:fontRef idx="minor">
+            <a:schemeClr val="dk1"/>
+          </a:fontRef>
+        </p:style>
+        <p:txBody>
+          <a:bodyPr rtlCol="0" anchor="t" anchorCtr="0"/>
+          <a:lstStyle/>
+          <a:p>
+            <a:pPr algn="ctr"/>
+            <a:r>
+              <a:rPr lang="en-US" sz="1200" dirty="0" smtClean="0">
+                <a:solidFill>
+                  <a:srgbClr val="00B0F0"/>
+                </a:solidFill>
+              </a:rPr>
+              <a:t>4. </a:t>
+            </a:r>
+            <a:r>
+              <a:rPr lang="en-US" sz="1200" dirty="0" smtClean="0"/>
+              <a:t>You can also destroy an enemy cannon ball by firing a cannon ball with same color </a:t>
+            </a:r>
+            <a:endParaRPr lang="en-US" sz="1200" dirty="0"/>
+          </a:p>
+        </p:txBody>
+      </p:sp>
+      <p:sp>
+        <p:nvSpPr>
+          <p:cNvPr id="20" name="Rounded Rectangle 19"/>
+          <p:cNvSpPr/>
+          <p:nvPr/>
+        </p:nvSpPr>
+        <p:spPr>
+          <a:xfrm>
+            <a:off x="3657600" y="2209800"/>
+            <a:ext cx="3429000" cy="685800"/>
+          </a:xfrm>
+          <a:prstGeom prst="roundRect">
+            <a:avLst/>
+          </a:prstGeom>
+        </p:spPr>
+        <p:style>
+          <a:lnRef idx="1">
+            <a:schemeClr val="accent2"/>
+          </a:lnRef>
+          <a:fillRef idx="2">
+            <a:schemeClr val="accent2"/>
+          </a:fillRef>
+          <a:effectRef idx="1">
+            <a:schemeClr val="accent2"/>
+          </a:effectRef>
+          <a:fontRef idx="minor">
+            <a:schemeClr val="dk1"/>
+          </a:fontRef>
+        </p:style>
+        <p:txBody>
+          <a:bodyPr rtlCol="0" anchor="t" anchorCtr="0"/>
+          <a:lstStyle/>
+          <a:p>
+            <a:pPr algn="ctr"/>
+            <a:r>
+              <a:rPr lang="en-US" sz="1200" dirty="0" smtClean="0">
+                <a:solidFill>
+                  <a:srgbClr val="00B0F0"/>
+                </a:solidFill>
+              </a:rPr>
+              <a:t>5. </a:t>
+            </a:r>
+            <a:r>
+              <a:rPr lang="en-US" sz="1200" dirty="0" smtClean="0"/>
+              <a:t>To destroy enemy cannon, a necessary strategy is to destroy enemy cannon ball and immediately fire rest of cannon balls by changing shield color</a:t>
+            </a:r>
+            <a:endParaRPr lang="en-US" sz="1200" dirty="0"/>
+          </a:p>
+        </p:txBody>
+      </p:sp>
+      <p:sp>
+        <p:nvSpPr>
+          <p:cNvPr id="22" name="Rounded Rectangular Callout 21"/>
+          <p:cNvSpPr/>
+          <p:nvPr/>
+        </p:nvSpPr>
+        <p:spPr>
+          <a:xfrm>
+            <a:off x="5562600" y="990600"/>
+            <a:ext cx="1828800" cy="381000"/>
+          </a:xfrm>
+          <a:prstGeom prst="wedgeRoundRectCallout">
+            <a:avLst>
+              <a:gd name="adj1" fmla="val -5812"/>
+              <a:gd name="adj2" fmla="val -78695"/>
+              <a:gd name="adj3" fmla="val 16667"/>
+            </a:avLst>
+          </a:prstGeom>
+        </p:spPr>
+        <p:style>
+          <a:lnRef idx="1">
+            <a:schemeClr val="accent6"/>
+          </a:lnRef>
+          <a:fillRef idx="2">
+            <a:schemeClr val="accent6"/>
+          </a:fillRef>
+          <a:effectRef idx="1">
+            <a:schemeClr val="accent6"/>
+          </a:effectRef>
+          <a:fontRef idx="minor">
+            <a:schemeClr val="dk1"/>
+          </a:fontRef>
+        </p:style>
+        <p:txBody>
+          <a:bodyPr rtlCol="0" anchor="t" anchorCtr="0"/>
+          <a:lstStyle/>
+          <a:p>
+            <a:pPr algn="ctr"/>
+            <a:r>
+              <a:rPr lang="en-US" sz="1050" dirty="0" smtClean="0">
+                <a:solidFill>
+                  <a:srgbClr val="00B0F0"/>
+                </a:solidFill>
+              </a:rPr>
+              <a:t>4. </a:t>
+            </a:r>
+            <a:r>
+              <a:rPr lang="en-US" sz="1050" dirty="0" smtClean="0"/>
+              <a:t>Remember </a:t>
+            </a:r>
+            <a:r>
+              <a:rPr lang="en-US" sz="1050" dirty="0" smtClean="0"/>
+              <a:t>you </a:t>
+            </a:r>
+            <a:r>
+              <a:rPr lang="en-US" sz="1050" dirty="0" smtClean="0"/>
+              <a:t>can </a:t>
+            </a:r>
+            <a:r>
+              <a:rPr lang="en-US" sz="1050" dirty="0" smtClean="0"/>
+              <a:t>fight, even with </a:t>
+            </a:r>
+            <a:r>
+              <a:rPr lang="en-US" sz="1050" dirty="0" smtClean="0"/>
+              <a:t>your shield </a:t>
+            </a:r>
+            <a:r>
+              <a:rPr lang="en-US" sz="1050" dirty="0" smtClean="0"/>
+              <a:t>down!</a:t>
+            </a:r>
+            <a:endParaRPr lang="en-US" sz="1050" dirty="0"/>
           </a:p>
         </p:txBody>
       </p:sp>

</xml_diff>